<commit_message>
preview Ken Griffey Jr.
</commit_message>
<xml_diff>
--- a/misc/cover2.pptx
+++ b/misc/cover2.pptx
@@ -2993,7 +2993,7 @@
         </p:nvSpPr>
         <p:spPr>
           <a:xfrm>
-            <a:off x="0" y="-20638"/>
+            <a:off x="0" y="-264152"/>
             <a:ext cx="6858000" cy="11879263"/>
           </a:xfrm>
           <a:prstGeom prst="rect">
@@ -3095,6 +3095,105 @@
           <a:prstGeom prst="rect">
             <a:avLst/>
           </a:prstGeom>
+        </p:spPr>
+      </p:pic>
+      <p:sp>
+        <p:nvSpPr>
+          <p:cNvPr id="6" name="Oval 5">
+            <a:extLst>
+              <a:ext uri="{FF2B5EF4-FFF2-40B4-BE49-F238E27FC236}">
+                <a16:creationId xmlns:a16="http://schemas.microsoft.com/office/drawing/2014/main" id="{D3458432-DAD6-253C-9F0C-2FA7B0E73EA0}"/>
+              </a:ext>
+            </a:extLst>
+          </p:cNvPr>
+          <p:cNvSpPr/>
+          <p:nvPr/>
+        </p:nvSpPr>
+        <p:spPr>
+          <a:xfrm>
+            <a:off x="5888736" y="235157"/>
+            <a:ext cx="825547" cy="825547"/>
+          </a:xfrm>
+          <a:prstGeom prst="ellipse">
+            <a:avLst/>
+          </a:prstGeom>
+          <a:solidFill>
+            <a:schemeClr val="bg1"/>
+          </a:solidFill>
+          <a:ln>
+            <a:noFill/>
+          </a:ln>
+        </p:spPr>
+        <p:style>
+          <a:lnRef idx="2">
+            <a:schemeClr val="accent1">
+              <a:shade val="15000"/>
+            </a:schemeClr>
+          </a:lnRef>
+          <a:fillRef idx="1">
+            <a:schemeClr val="accent1"/>
+          </a:fillRef>
+          <a:effectRef idx="0">
+            <a:schemeClr val="accent1"/>
+          </a:effectRef>
+          <a:fontRef idx="minor">
+            <a:schemeClr val="lt1"/>
+          </a:fontRef>
+        </p:style>
+        <p:txBody>
+          <a:bodyPr rtlCol="0" anchor="ctr"/>
+          <a:lstStyle/>
+          <a:p>
+            <a:pPr algn="ctr"/>
+            <a:endParaRPr lang="en-GB"/>
+          </a:p>
+        </p:txBody>
+      </p:sp>
+      <p:pic>
+        <p:nvPicPr>
+          <p:cNvPr id="1028" name="Picture 4" descr="Sound - Free ui icons">
+            <a:extLst>
+              <a:ext uri="{FF2B5EF4-FFF2-40B4-BE49-F238E27FC236}">
+                <a16:creationId xmlns:a16="http://schemas.microsoft.com/office/drawing/2014/main" id="{ECD4BD9C-F427-7858-0977-9E90EA87C22C}"/>
+              </a:ext>
+            </a:extLst>
+          </p:cNvPr>
+          <p:cNvPicPr>
+            <a:picLocks noChangeAspect="1" noChangeArrowheads="1"/>
+          </p:cNvPicPr>
+          <p:nvPr/>
+        </p:nvPicPr>
+        <p:blipFill>
+          <a:blip r:embed="rId3">
+            <a:extLst>
+              <a:ext uri="{28A0092B-C50C-407E-A947-70E740481C1C}">
+                <a14:useLocalDpi xmlns:a14="http://schemas.microsoft.com/office/drawing/2010/main" val="0"/>
+              </a:ext>
+            </a:extLst>
+          </a:blip>
+          <a:srcRect/>
+          <a:stretch>
+            <a:fillRect/>
+          </a:stretch>
+        </p:blipFill>
+        <p:spPr bwMode="auto">
+          <a:xfrm>
+            <a:off x="6009829" y="356250"/>
+            <a:ext cx="583360" cy="583360"/>
+          </a:xfrm>
+          <a:prstGeom prst="rect">
+            <a:avLst/>
+          </a:prstGeom>
+          <a:noFill/>
+          <a:extLst>
+            <a:ext uri="{909E8E84-426E-40DD-AFC4-6F175D3DCCD1}">
+              <a14:hiddenFill xmlns:a14="http://schemas.microsoft.com/office/drawing/2010/main">
+                <a:solidFill>
+                  <a:srgbClr val="FFFFFF"/>
+                </a:solidFill>
+              </a14:hiddenFill>
+            </a:ext>
+          </a:extLst>
         </p:spPr>
       </p:pic>
     </p:spTree>

</xml_diff>

<commit_message>
1.mp4 one more time
</commit_message>
<xml_diff>
--- a/misc/cover2.pptx
+++ b/misc/cover2.pptx
@@ -3057,7 +3057,7 @@
         </p:blipFill>
         <p:spPr>
           <a:xfrm>
-            <a:off x="1531370" y="8111190"/>
+            <a:off x="1531370" y="8202630"/>
             <a:ext cx="3795261" cy="3491640"/>
           </a:xfrm>
           <a:prstGeom prst="rect">
@@ -3089,7 +3089,7 @@
         </p:blipFill>
         <p:spPr>
           <a:xfrm rot="10800000">
-            <a:off x="1531370" y="235158"/>
+            <a:off x="1531370" y="180294"/>
             <a:ext cx="3795261" cy="3491640"/>
           </a:xfrm>
           <a:prstGeom prst="rect">
@@ -3097,6 +3097,88 @@
           </a:prstGeom>
         </p:spPr>
       </p:pic>
+      <p:sp>
+        <p:nvSpPr>
+          <p:cNvPr id="6" name="TextBox 5">
+            <a:extLst>
+              <a:ext uri="{FF2B5EF4-FFF2-40B4-BE49-F238E27FC236}">
+                <a16:creationId xmlns:a16="http://schemas.microsoft.com/office/drawing/2014/main" id="{0F1B89BB-987E-6099-FD14-359A11A36619}"/>
+              </a:ext>
+            </a:extLst>
+          </p:cNvPr>
+          <p:cNvSpPr txBox="1"/>
+          <p:nvPr/>
+        </p:nvSpPr>
+        <p:spPr>
+          <a:xfrm>
+            <a:off x="1378583" y="3324462"/>
+            <a:ext cx="4100834" cy="5109091"/>
+          </a:xfrm>
+          <a:prstGeom prst="rect">
+            <a:avLst/>
+          </a:prstGeom>
+          <a:noFill/>
+        </p:spPr>
+        <p:txBody>
+          <a:bodyPr wrap="square">
+            <a:spAutoFit/>
+          </a:bodyPr>
+          <a:lstStyle/>
+          <a:p>
+            <a:pPr algn="ctr"/>
+            <a:r>
+              <a:rPr lang="en-GB" sz="3600" b="1" spc="300" dirty="0">
+                <a:solidFill>
+                  <a:schemeClr val="bg1"/>
+                </a:solidFill>
+                <a:latin typeface="Verdana" panose="020B0604030504040204" pitchFamily="34" charset="0"/>
+                <a:ea typeface="Verdana" panose="020B0604030504040204" pitchFamily="34" charset="0"/>
+                <a:cs typeface="Verdana" panose="020B0604030504040204" pitchFamily="34" charset="0"/>
+              </a:rPr>
+              <a:t>Swing Mechanics Instructional Videos</a:t>
+            </a:r>
+          </a:p>
+          <a:p>
+            <a:pPr algn="ctr"/>
+            <a:endParaRPr lang="en-GB" sz="2000" b="1" spc="300" dirty="0">
+              <a:solidFill>
+                <a:schemeClr val="bg1"/>
+              </a:solidFill>
+              <a:latin typeface="Verdana" panose="020B0604030504040204" pitchFamily="34" charset="0"/>
+              <a:ea typeface="Verdana" panose="020B0604030504040204" pitchFamily="34" charset="0"/>
+              <a:cs typeface="Verdana" panose="020B0604030504040204" pitchFamily="34" charset="0"/>
+            </a:endParaRPr>
+          </a:p>
+          <a:p>
+            <a:pPr algn="ctr"/>
+            <a:r>
+              <a:rPr lang="en-GB" sz="5400" b="1" spc="300" dirty="0">
+                <a:solidFill>
+                  <a:schemeClr val="bg1"/>
+                </a:solidFill>
+                <a:latin typeface="Verdana" panose="020B0604030504040204" pitchFamily="34" charset="0"/>
+                <a:ea typeface="Verdana" panose="020B0604030504040204" pitchFamily="34" charset="0"/>
+                <a:cs typeface="Verdana" panose="020B0604030504040204" pitchFamily="34" charset="0"/>
+              </a:rPr>
+              <a:t>⚾️</a:t>
+            </a:r>
+          </a:p>
+          <a:p>
+            <a:pPr algn="ctr"/>
+            <a:r>
+              <a:rPr lang="en-GB" sz="3600" b="1" spc="300" dirty="0">
+                <a:solidFill>
+                  <a:schemeClr val="bg1"/>
+                </a:solidFill>
+                <a:latin typeface="Verdana" panose="020B0604030504040204" pitchFamily="34" charset="0"/>
+                <a:ea typeface="Verdana" panose="020B0604030504040204" pitchFamily="34" charset="0"/>
+                <a:cs typeface="Verdana" panose="020B0604030504040204" pitchFamily="34" charset="0"/>
+              </a:rPr>
+              <a:t> Baseball Softball Rounders</a:t>
+            </a:r>
+          </a:p>
+        </p:txBody>
+      </p:sp>
     </p:spTree>
     <p:extLst>
       <p:ext uri="{BB962C8B-B14F-4D97-AF65-F5344CB8AC3E}">
@@ -3107,6 +3189,83 @@
   <p:clrMapOvr>
     <a:masterClrMapping/>
   </p:clrMapOvr>
+  <p:timing>
+    <p:tnLst>
+      <p:par>
+        <p:cTn id="1" dur="indefinite" restart="never" nodeType="tmRoot">
+          <p:childTnLst>
+            <p:seq concurrent="1" nextAc="seek">
+              <p:cTn id="2" dur="indefinite" nodeType="mainSeq">
+                <p:childTnLst>
+                  <p:par>
+                    <p:cTn id="3" fill="hold">
+                      <p:stCondLst>
+                        <p:cond delay="indefinite"/>
+                      </p:stCondLst>
+                      <p:childTnLst>
+                        <p:par>
+                          <p:cTn id="4" fill="hold">
+                            <p:stCondLst>
+                              <p:cond delay="0"/>
+                            </p:stCondLst>
+                            <p:childTnLst>
+                              <p:par>
+                                <p:cTn id="5" presetID="26" presetClass="emph" presetSubtype="0" fill="hold" grpId="0" nodeType="clickEffect">
+                                  <p:stCondLst>
+                                    <p:cond delay="0"/>
+                                  </p:stCondLst>
+                                  <p:childTnLst>
+                                    <p:animEffect transition="out" filter="fade">
+                                      <p:cBhvr>
+                                        <p:cTn id="6" dur="500" tmFilter="0, 0; .2, .5; .8, .5; 1, 0"/>
+                                        <p:tgtEl>
+                                          <p:spTgt spid="6"/>
+                                        </p:tgtEl>
+                                      </p:cBhvr>
+                                    </p:animEffect>
+                                    <p:animScale>
+                                      <p:cBhvr>
+                                        <p:cTn id="7" dur="250" autoRev="1" fill="hold"/>
+                                        <p:tgtEl>
+                                          <p:spTgt spid="6"/>
+                                        </p:tgtEl>
+                                      </p:cBhvr>
+                                      <p:by x="105000" y="105000"/>
+                                    </p:animScale>
+                                  </p:childTnLst>
+                                </p:cTn>
+                              </p:par>
+                            </p:childTnLst>
+                          </p:cTn>
+                        </p:par>
+                      </p:childTnLst>
+                    </p:cTn>
+                  </p:par>
+                </p:childTnLst>
+              </p:cTn>
+              <p:prevCondLst>
+                <p:cond evt="onPrev" delay="0">
+                  <p:tgtEl>
+                    <p:sldTgt/>
+                  </p:tgtEl>
+                </p:cond>
+              </p:prevCondLst>
+              <p:nextCondLst>
+                <p:cond evt="onNext" delay="0">
+                  <p:tgtEl>
+                    <p:sldTgt/>
+                  </p:tgtEl>
+                </p:cond>
+              </p:nextCondLst>
+            </p:seq>
+          </p:childTnLst>
+        </p:cTn>
+      </p:par>
+    </p:tnLst>
+    <p:bldLst>
+      <p:bldP spid="6" grpId="0"/>
+    </p:bldLst>
+  </p:timing>
 </p:sld>
 </file>
 

</xml_diff>